<commit_message>
REMOVED stars, show sticker instead, ADDED tutorial explanation sounds, reset sound, finish level sounds
</commit_message>
<xml_diff>
--- a/Task-switching/Sources/new/Tutorial.pptx
+++ b/Task-switching/Sources/new/Tutorial.pptx
@@ -104,6 +104,11 @@
       </a:defRPr>
     </a:lvl9pPr>
   </p:defaultTextStyle>
+  <p:extLst>
+    <p:ext uri="{EFAFB233-063F-42B5-8137-9DF3F51BA10A}">
+      <p15:sldGuideLst xmlns:p15="http://schemas.microsoft.com/office/powerpoint/2012/main"/>
+    </p:ext>
+  </p:extLst>
 </p:presentation>
 </file>
 
@@ -254,7 +259,7 @@
           <a:p>
             <a:fld id="{7659EBB2-A52F-4C5D-9D60-1B6F9486C35A}" type="datetimeFigureOut">
               <a:rPr lang="de-DE" smtClean="0"/>
-              <a:t>07.06.2021</a:t>
+              <a:t>08.07.2021</a:t>
             </a:fld>
             <a:endParaRPr lang="de-DE"/>
           </a:p>
@@ -452,7 +457,7 @@
           <a:p>
             <a:fld id="{7659EBB2-A52F-4C5D-9D60-1B6F9486C35A}" type="datetimeFigureOut">
               <a:rPr lang="de-DE" smtClean="0"/>
-              <a:t>07.06.2021</a:t>
+              <a:t>08.07.2021</a:t>
             </a:fld>
             <a:endParaRPr lang="de-DE"/>
           </a:p>
@@ -660,7 +665,7 @@
           <a:p>
             <a:fld id="{7659EBB2-A52F-4C5D-9D60-1B6F9486C35A}" type="datetimeFigureOut">
               <a:rPr lang="de-DE" smtClean="0"/>
-              <a:t>07.06.2021</a:t>
+              <a:t>08.07.2021</a:t>
             </a:fld>
             <a:endParaRPr lang="de-DE"/>
           </a:p>
@@ -858,7 +863,7 @@
           <a:p>
             <a:fld id="{7659EBB2-A52F-4C5D-9D60-1B6F9486C35A}" type="datetimeFigureOut">
               <a:rPr lang="de-DE" smtClean="0"/>
-              <a:t>07.06.2021</a:t>
+              <a:t>08.07.2021</a:t>
             </a:fld>
             <a:endParaRPr lang="de-DE"/>
           </a:p>
@@ -1133,7 +1138,7 @@
           <a:p>
             <a:fld id="{7659EBB2-A52F-4C5D-9D60-1B6F9486C35A}" type="datetimeFigureOut">
               <a:rPr lang="de-DE" smtClean="0"/>
-              <a:t>07.06.2021</a:t>
+              <a:t>08.07.2021</a:t>
             </a:fld>
             <a:endParaRPr lang="de-DE"/>
           </a:p>
@@ -1398,7 +1403,7 @@
           <a:p>
             <a:fld id="{7659EBB2-A52F-4C5D-9D60-1B6F9486C35A}" type="datetimeFigureOut">
               <a:rPr lang="de-DE" smtClean="0"/>
-              <a:t>07.06.2021</a:t>
+              <a:t>08.07.2021</a:t>
             </a:fld>
             <a:endParaRPr lang="de-DE"/>
           </a:p>
@@ -1810,7 +1815,7 @@
           <a:p>
             <a:fld id="{7659EBB2-A52F-4C5D-9D60-1B6F9486C35A}" type="datetimeFigureOut">
               <a:rPr lang="de-DE" smtClean="0"/>
-              <a:t>07.06.2021</a:t>
+              <a:t>08.07.2021</a:t>
             </a:fld>
             <a:endParaRPr lang="de-DE"/>
           </a:p>
@@ -1951,7 +1956,7 @@
           <a:p>
             <a:fld id="{7659EBB2-A52F-4C5D-9D60-1B6F9486C35A}" type="datetimeFigureOut">
               <a:rPr lang="de-DE" smtClean="0"/>
-              <a:t>07.06.2021</a:t>
+              <a:t>08.07.2021</a:t>
             </a:fld>
             <a:endParaRPr lang="de-DE"/>
           </a:p>
@@ -2064,7 +2069,7 @@
           <a:p>
             <a:fld id="{7659EBB2-A52F-4C5D-9D60-1B6F9486C35A}" type="datetimeFigureOut">
               <a:rPr lang="de-DE" smtClean="0"/>
-              <a:t>07.06.2021</a:t>
+              <a:t>08.07.2021</a:t>
             </a:fld>
             <a:endParaRPr lang="de-DE"/>
           </a:p>
@@ -2375,7 +2380,7 @@
           <a:p>
             <a:fld id="{7659EBB2-A52F-4C5D-9D60-1B6F9486C35A}" type="datetimeFigureOut">
               <a:rPr lang="de-DE" smtClean="0"/>
-              <a:t>07.06.2021</a:t>
+              <a:t>08.07.2021</a:t>
             </a:fld>
             <a:endParaRPr lang="de-DE"/>
           </a:p>
@@ -2663,7 +2668,7 @@
           <a:p>
             <a:fld id="{7659EBB2-A52F-4C5D-9D60-1B6F9486C35A}" type="datetimeFigureOut">
               <a:rPr lang="de-DE" smtClean="0"/>
-              <a:t>07.06.2021</a:t>
+              <a:t>08.07.2021</a:t>
             </a:fld>
             <a:endParaRPr lang="de-DE"/>
           </a:p>
@@ -2904,7 +2909,7 @@
           <a:p>
             <a:fld id="{7659EBB2-A52F-4C5D-9D60-1B6F9486C35A}" type="datetimeFigureOut">
               <a:rPr lang="de-DE" smtClean="0"/>
-              <a:t>07.06.2021</a:t>
+              <a:t>08.07.2021</a:t>
             </a:fld>
             <a:endParaRPr lang="de-DE"/>
           </a:p>
@@ -3361,7 +3366,7 @@
           <p:nvPr/>
         </p:nvPicPr>
         <p:blipFill>
-          <a:blip r:embed="rId2">
+          <a:blip r:embed="rId5">
             <a:extLst>
               <a:ext uri="{28A0092B-C50C-407E-A947-70E740481C1C}">
                 <a14:useLocalDpi xmlns:a14="http://schemas.microsoft.com/office/drawing/2010/main" val="0"/>
@@ -3399,7 +3404,7 @@
           </p:nvPr>
         </p:nvPicPr>
         <p:blipFill>
-          <a:blip r:embed="rId3">
+          <a:blip r:embed="rId6">
             <a:extLst>
               <a:ext uri="{28A0092B-C50C-407E-A947-70E740481C1C}">
                 <a14:useLocalDpi xmlns:a14="http://schemas.microsoft.com/office/drawing/2010/main" val="0"/>
@@ -3432,7 +3437,7 @@
           <p:nvPr/>
         </p:nvPicPr>
         <p:blipFill>
-          <a:blip r:embed="rId4">
+          <a:blip r:embed="rId7">
             <a:extLst>
               <a:ext uri="{28A0092B-C50C-407E-A947-70E740481C1C}">
                 <a14:useLocalDpi xmlns:a14="http://schemas.microsoft.com/office/drawing/2010/main" val="0"/>
@@ -3468,7 +3473,7 @@
           <p:nvPr/>
         </p:nvPicPr>
         <p:blipFill>
-          <a:blip r:embed="rId5">
+          <a:blip r:embed="rId8">
             <a:extLst>
               <a:ext uri="{28A0092B-C50C-407E-A947-70E740481C1C}">
                 <a14:useLocalDpi xmlns:a14="http://schemas.microsoft.com/office/drawing/2010/main" val="0"/>
@@ -3491,10 +3496,10 @@
       </p:pic>
       <p:pic>
         <p:nvPicPr>
-          <p:cNvPr id="17" name="Grafik 16">
-            <a:extLst>
-              <a:ext uri="{FF2B5EF4-FFF2-40B4-BE49-F238E27FC236}">
-                <a16:creationId xmlns:a16="http://schemas.microsoft.com/office/drawing/2014/main" id="{3E91275E-134E-43BB-9FA3-D4C58BC26450}"/>
+          <p:cNvPr id="19" name="Grafik 18">
+            <a:extLst>
+              <a:ext uri="{FF2B5EF4-FFF2-40B4-BE49-F238E27FC236}">
+                <a16:creationId xmlns:a16="http://schemas.microsoft.com/office/drawing/2014/main" id="{5F46E582-B58C-4B1E-BBD3-BB2116D52A53}"/>
               </a:ext>
             </a:extLst>
           </p:cNvPr>
@@ -3504,7 +3509,7 @@
           <p:nvPr/>
         </p:nvPicPr>
         <p:blipFill>
-          <a:blip r:embed="rId6">
+          <a:blip r:embed="rId9">
             <a:extLst>
               <a:ext uri="{28A0092B-C50C-407E-A947-70E740481C1C}">
                 <a14:useLocalDpi xmlns:a14="http://schemas.microsoft.com/office/drawing/2010/main" val="0"/>
@@ -3517,43 +3522,7 @@
         </p:blipFill>
         <p:spPr>
           <a:xfrm>
-            <a:off x="9420836" y="636089"/>
-            <a:ext cx="713065" cy="668097"/>
-          </a:xfrm>
-          <a:prstGeom prst="rect">
-            <a:avLst/>
-          </a:prstGeom>
-        </p:spPr>
-      </p:pic>
-      <p:pic>
-        <p:nvPicPr>
-          <p:cNvPr id="19" name="Grafik 18">
-            <a:extLst>
-              <a:ext uri="{FF2B5EF4-FFF2-40B4-BE49-F238E27FC236}">
-                <a16:creationId xmlns:a16="http://schemas.microsoft.com/office/drawing/2014/main" id="{5F46E582-B58C-4B1E-BBD3-BB2116D52A53}"/>
-              </a:ext>
-            </a:extLst>
-          </p:cNvPr>
-          <p:cNvPicPr>
-            <a:picLocks noChangeAspect="1"/>
-          </p:cNvPicPr>
-          <p:nvPr/>
-        </p:nvPicPr>
-        <p:blipFill>
-          <a:blip r:embed="rId7">
-            <a:extLst>
-              <a:ext uri="{28A0092B-C50C-407E-A947-70E740481C1C}">
-                <a14:useLocalDpi xmlns:a14="http://schemas.microsoft.com/office/drawing/2010/main" val="0"/>
-              </a:ext>
-            </a:extLst>
-          </a:blip>
-          <a:stretch>
-            <a:fillRect/>
-          </a:stretch>
-        </p:blipFill>
-        <p:spPr>
-          <a:xfrm>
-            <a:off x="5123808" y="559038"/>
+            <a:off x="5165130" y="501469"/>
             <a:ext cx="1941890" cy="2198972"/>
           </a:xfrm>
           <a:prstGeom prst="rect">
@@ -3576,7 +3545,7 @@
           <p:nvPr/>
         </p:nvPicPr>
         <p:blipFill>
-          <a:blip r:embed="rId8">
+          <a:blip r:embed="rId10">
             <a:extLst>
               <a:ext uri="{28A0092B-C50C-407E-A947-70E740481C1C}">
                 <a14:useLocalDpi xmlns:a14="http://schemas.microsoft.com/office/drawing/2010/main" val="0"/>
@@ -3589,7 +3558,7 @@
         </p:blipFill>
         <p:spPr>
           <a:xfrm>
-            <a:off x="5123808" y="558578"/>
+            <a:off x="5206365" y="527432"/>
             <a:ext cx="1941890" cy="2198973"/>
           </a:xfrm>
           <a:prstGeom prst="rect">
@@ -3612,7 +3581,7 @@
           <p:nvPr/>
         </p:nvPicPr>
         <p:blipFill>
-          <a:blip r:embed="rId2">
+          <a:blip r:embed="rId5">
             <a:extLst>
               <a:ext uri="{28A0092B-C50C-407E-A947-70E740481C1C}">
                 <a14:useLocalDpi xmlns:a14="http://schemas.microsoft.com/office/drawing/2010/main" val="0"/>
@@ -3625,7 +3594,7 @@
         </p:blipFill>
         <p:spPr>
           <a:xfrm>
-            <a:off x="5165130" y="558119"/>
+            <a:off x="5165130" y="531410"/>
             <a:ext cx="1829262" cy="2071434"/>
           </a:xfrm>
           <a:prstGeom prst="rect">
@@ -3633,7 +3602,84 @@
           </a:prstGeom>
         </p:spPr>
       </p:pic>
+      <p:pic>
+        <p:nvPicPr>
+          <p:cNvPr id="4" name="Grafik 3">
+            <a:extLst>
+              <a:ext uri="{FF2B5EF4-FFF2-40B4-BE49-F238E27FC236}">
+                <a16:creationId xmlns:a16="http://schemas.microsoft.com/office/drawing/2014/main" id="{5EAF27FD-48C6-46F7-8CAF-0405A6EB2262}"/>
+              </a:ext>
+            </a:extLst>
+          </p:cNvPr>
+          <p:cNvPicPr>
+            <a:picLocks noChangeAspect="1"/>
+          </p:cNvPicPr>
+          <p:nvPr/>
+        </p:nvPicPr>
+        <p:blipFill>
+          <a:blip r:embed="rId11">
+            <a:extLst>
+              <a:ext uri="{28A0092B-C50C-407E-A947-70E740481C1C}">
+                <a14:useLocalDpi xmlns:a14="http://schemas.microsoft.com/office/drawing/2010/main" val="0"/>
+              </a:ext>
+            </a:extLst>
+          </a:blip>
+          <a:stretch>
+            <a:fillRect/>
+          </a:stretch>
+        </p:blipFill>
+        <p:spPr>
+          <a:xfrm>
+            <a:off x="9476804" y="629191"/>
+            <a:ext cx="640318" cy="555821"/>
+          </a:xfrm>
+          <a:prstGeom prst="rect">
+            <a:avLst/>
+          </a:prstGeom>
+        </p:spPr>
+      </p:pic>
+      <p:pic>
+        <p:nvPicPr>
+          <p:cNvPr id="5" name="Audio 4">
+            <a:hlinkClick r:id="" action="ppaction://media"/>
+            <a:extLst>
+              <a:ext uri="{FF2B5EF4-FFF2-40B4-BE49-F238E27FC236}">
+                <a16:creationId xmlns:a16="http://schemas.microsoft.com/office/drawing/2014/main" id="{5EE81383-FEA7-46AF-A4A8-BCAC88DC82A1}"/>
+              </a:ext>
+            </a:extLst>
+          </p:cNvPr>
+          <p:cNvPicPr>
+            <a:picLocks noChangeAspect="1"/>
+          </p:cNvPicPr>
+          <p:nvPr>
+            <a:audioFile r:link="rId3"/>
+            <p:extLst>
+              <p:ext uri="{DAA4B4D4-6D71-4841-9C94-3DE7FCFB9230}">
+                <p14:media xmlns:p14="http://schemas.microsoft.com/office/powerpoint/2010/main" r:embed="rId2"/>
+              </p:ext>
+            </p:extLst>
+          </p:nvPr>
+        </p:nvPicPr>
+        <p:blipFill>
+          <a:blip r:embed="rId12"/>
+          <a:stretch>
+            <a:fillRect/>
+          </a:stretch>
+        </p:blipFill>
+        <p:spPr>
+          <a:xfrm>
+            <a:off x="11366500" y="6032500"/>
+            <a:ext cx="609600" cy="609600"/>
+          </a:xfrm>
+          <a:prstGeom prst="rect">
+            <a:avLst/>
+          </a:prstGeom>
+        </p:spPr>
+      </p:pic>
     </p:spTree>
+    <p:custDataLst>
+      <p:tags r:id="rId1"/>
+    </p:custDataLst>
     <p:extLst>
       <p:ext uri="{BB962C8B-B14F-4D97-AF65-F5344CB8AC3E}">
         <p14:creationId xmlns:p14="http://schemas.microsoft.com/office/powerpoint/2010/main" val="1602117204"/>
@@ -3643,6 +3689,14 @@
   <p:clrMapOvr>
     <a:masterClrMapping/>
   </p:clrMapOvr>
+  <mc:AlternateContent xmlns:mc="http://schemas.openxmlformats.org/markup-compatibility/2006">
+    <mc:Choice xmlns:p14="http://schemas.microsoft.com/office/powerpoint/2010/main" Requires="p14">
+      <p:transition spd="slow" p14:dur="2000" advTm="34580"/>
+    </mc:Choice>
+    <mc:Fallback>
+      <p:transition spd="slow" advTm="34580"/>
+    </mc:Fallback>
+  </mc:AlternateContent>
   <p:timing>
     <p:tnLst>
       <p:par>
@@ -3655,6 +3709,9 @@
                     <p:cTn id="3" fill="hold">
                       <p:stCondLst>
                         <p:cond delay="indefinite"/>
+                        <p:cond evt="onBegin" delay="0">
+                          <p:tn val="2"/>
+                        </p:cond>
                       </p:stCondLst>
                       <p:childTnLst>
                         <p:par>
@@ -3664,29 +3721,19 @@
                             </p:stCondLst>
                             <p:childTnLst>
                               <p:par>
-                                <p:cTn id="5" presetID="1" presetClass="entr" presetSubtype="0" fill="hold" nodeType="clickEffect">
+                                <p:cTn id="5" presetID="1" presetClass="mediacall" presetSubtype="0" fill="hold" nodeType="afterEffect">
                                   <p:stCondLst>
                                     <p:cond delay="0"/>
                                   </p:stCondLst>
                                   <p:childTnLst>
-                                    <p:set>
+                                    <p:cmd type="call" cmd="playFrom(0.0)">
                                       <p:cBhvr>
-                                        <p:cTn id="6" dur="1" fill="hold">
-                                          <p:stCondLst>
-                                            <p:cond delay="0"/>
-                                          </p:stCondLst>
-                                        </p:cTn>
+                                        <p:cTn id="6" dur="1" fill="hold"/>
                                         <p:tgtEl>
-                                          <p:spTgt spid="15"/>
+                                          <p:spTgt spid="5"/>
                                         </p:tgtEl>
-                                        <p:attrNameLst>
-                                          <p:attrName>style.visibility</p:attrName>
-                                        </p:attrNameLst>
                                       </p:cBhvr>
-                                      <p:to>
-                                        <p:strVal val="visible"/>
-                                      </p:to>
-                                    </p:set>
+                                    </p:cmd>
                                   </p:childTnLst>
                                 </p:cTn>
                               </p:par>
@@ -3722,7 +3769,7 @@
                                           </p:stCondLst>
                                         </p:cTn>
                                         <p:tgtEl>
-                                          <p:spTgt spid="17"/>
+                                          <p:spTgt spid="15"/>
                                         </p:tgtEl>
                                         <p:attrNameLst>
                                           <p:attrName>style.visibility</p:attrName>
@@ -3754,16 +3801,61 @@
                             </p:stCondLst>
                             <p:childTnLst>
                               <p:par>
-                                <p:cTn id="13" presetID="7" presetClass="emph" presetSubtype="2" fill="hold" nodeType="clickEffect">
+                                <p:cTn id="13" presetID="1" presetClass="entr" presetSubtype="0" fill="hold" nodeType="clickEffect">
+                                  <p:stCondLst>
+                                    <p:cond delay="0"/>
+                                  </p:stCondLst>
+                                  <p:childTnLst>
+                                    <p:set>
+                                      <p:cBhvr>
+                                        <p:cTn id="14" dur="1" fill="hold">
+                                          <p:stCondLst>
+                                            <p:cond delay="0"/>
+                                          </p:stCondLst>
+                                        </p:cTn>
+                                        <p:tgtEl>
+                                          <p:spTgt spid="4"/>
+                                        </p:tgtEl>
+                                        <p:attrNameLst>
+                                          <p:attrName>style.visibility</p:attrName>
+                                        </p:attrNameLst>
+                                      </p:cBhvr>
+                                      <p:to>
+                                        <p:strVal val="visible"/>
+                                      </p:to>
+                                    </p:set>
+                                  </p:childTnLst>
+                                </p:cTn>
+                              </p:par>
+                            </p:childTnLst>
+                          </p:cTn>
+                        </p:par>
+                      </p:childTnLst>
+                    </p:cTn>
+                  </p:par>
+                  <p:par>
+                    <p:cTn id="15" fill="hold">
+                      <p:stCondLst>
+                        <p:cond delay="indefinite"/>
+                      </p:stCondLst>
+                      <p:childTnLst>
+                        <p:par>
+                          <p:cTn id="16" fill="hold">
+                            <p:stCondLst>
+                              <p:cond delay="0"/>
+                            </p:stCondLst>
+                            <p:childTnLst>
+                              <p:par>
+                                <p:cTn id="17" presetID="7" presetClass="emph" presetSubtype="2" fill="hold" nodeType="clickEffect">
                                   <p:stCondLst>
                                     <p:cond delay="0"/>
                                   </p:stCondLst>
                                   <p:childTnLst>
                                     <p:animClr clrSpc="rgb" dir="cw">
                                       <p:cBhvr>
-                                        <p:cTn id="14" dur="2000" fill="hold"/>
+                                        <p:cTn id="18" dur="2000" fill="hold"/>
                                         <p:tgtEl>
-                                          <p:spTgt spid="17"/>
+                                          <p:spTgt spid="4"/>
                                         </p:tgtEl>
                                         <p:attrNameLst>
                                           <p:attrName>stroke.color</p:attrName>
@@ -3775,9 +3867,9 @@
                                     </p:animClr>
                                     <p:set>
                                       <p:cBhvr>
-                                        <p:cTn id="15" dur="2000" fill="hold"/>
+                                        <p:cTn id="19" dur="2000" fill="hold"/>
                                         <p:tgtEl>
-                                          <p:spTgt spid="17"/>
+                                          <p:spTgt spid="4"/>
                                         </p:tgtEl>
                                         <p:attrNameLst>
                                           <p:attrName>stroke.on</p:attrName>
@@ -3797,26 +3889,26 @@
                     </p:cTn>
                   </p:par>
                   <p:par>
-                    <p:cTn id="16" fill="hold">
+                    <p:cTn id="20" fill="hold">
                       <p:stCondLst>
                         <p:cond delay="indefinite"/>
                       </p:stCondLst>
                       <p:childTnLst>
                         <p:par>
-                          <p:cTn id="17" fill="hold">
+                          <p:cTn id="21" fill="hold">
                             <p:stCondLst>
                               <p:cond delay="0"/>
                             </p:stCondLst>
                             <p:childTnLst>
                               <p:par>
-                                <p:cTn id="18" presetID="2" presetClass="entr" presetSubtype="4" fill="hold" nodeType="clickEffect">
+                                <p:cTn id="22" presetID="2" presetClass="entr" presetSubtype="4" fill="hold" nodeType="clickEffect">
                                   <p:stCondLst>
                                     <p:cond delay="0"/>
                                   </p:stCondLst>
                                   <p:childTnLst>
                                     <p:set>
                                       <p:cBhvr>
-                                        <p:cTn id="19" dur="1" fill="hold">
+                                        <p:cTn id="23" dur="1" fill="hold">
                                           <p:stCondLst>
                                             <p:cond delay="0"/>
                                           </p:stCondLst>
@@ -3834,7 +3926,7 @@
                                     </p:set>
                                     <p:anim calcmode="lin" valueType="num">
                                       <p:cBhvr additive="base">
-                                        <p:cTn id="20" dur="500" fill="hold"/>
+                                        <p:cTn id="24" dur="500" fill="hold"/>
                                         <p:tgtEl>
                                           <p:spTgt spid="23"/>
                                         </p:tgtEl>
@@ -3857,7 +3949,7 @@
                                     </p:anim>
                                     <p:anim calcmode="lin" valueType="num">
                                       <p:cBhvr additive="base">
-                                        <p:cTn id="21" dur="500" fill="hold"/>
+                                        <p:cTn id="25" dur="500" fill="hold"/>
                                         <p:tgtEl>
                                           <p:spTgt spid="23"/>
                                         </p:tgtEl>
@@ -3888,26 +3980,26 @@
                     </p:cTn>
                   </p:par>
                   <p:par>
-                    <p:cTn id="22" fill="hold">
+                    <p:cTn id="26" fill="hold">
                       <p:stCondLst>
                         <p:cond delay="indefinite"/>
                       </p:stCondLst>
                       <p:childTnLst>
                         <p:par>
-                          <p:cTn id="23" fill="hold">
+                          <p:cTn id="27" fill="hold">
                             <p:stCondLst>
                               <p:cond delay="0"/>
                             </p:stCondLst>
                             <p:childTnLst>
                               <p:par>
-                                <p:cTn id="24" presetID="26" presetClass="emph" presetSubtype="0" fill="hold" nodeType="clickEffect">
+                                <p:cTn id="28" presetID="26" presetClass="emph" presetSubtype="0" fill="hold" nodeType="clickEffect">
                                   <p:stCondLst>
                                     <p:cond delay="0"/>
                                   </p:stCondLst>
                                   <p:childTnLst>
                                     <p:animEffect transition="out" filter="fade">
                                       <p:cBhvr>
-                                        <p:cTn id="25" dur="500" tmFilter="0, 0; .2, .5; .8, .5; 1, 0"/>
+                                        <p:cTn id="29" dur="500" tmFilter="0, 0; .2, .5; .8, .5; 1, 0"/>
                                         <p:tgtEl>
                                           <p:spTgt spid="23"/>
                                         </p:tgtEl>
@@ -3915,53 +4007,13 @@
                                     </p:animEffect>
                                     <p:animScale>
                                       <p:cBhvr>
-                                        <p:cTn id="26" dur="250" autoRev="1" fill="hold"/>
+                                        <p:cTn id="30" dur="250" autoRev="1" fill="hold"/>
                                         <p:tgtEl>
                                           <p:spTgt spid="23"/>
                                         </p:tgtEl>
                                       </p:cBhvr>
                                       <p:by x="105000" y="105000"/>
                                     </p:animScale>
-                                  </p:childTnLst>
-                                </p:cTn>
-                              </p:par>
-                            </p:childTnLst>
-                          </p:cTn>
-                        </p:par>
-                      </p:childTnLst>
-                    </p:cTn>
-                  </p:par>
-                  <p:par>
-                    <p:cTn id="27" fill="hold">
-                      <p:stCondLst>
-                        <p:cond delay="indefinite"/>
-                      </p:stCondLst>
-                      <p:childTnLst>
-                        <p:par>
-                          <p:cTn id="28" fill="hold">
-                            <p:stCondLst>
-                              <p:cond delay="0"/>
-                            </p:stCondLst>
-                            <p:childTnLst>
-                              <p:par>
-                                <p:cTn id="29" presetID="42" presetClass="path" presetSubtype="0" accel="50000" decel="50000" fill="hold" nodeType="clickEffect">
-                                  <p:stCondLst>
-                                    <p:cond delay="0"/>
-                                  </p:stCondLst>
-                                  <p:childTnLst>
-                                    <p:animMotion origin="layout" path="M 2.08333E-6 2.59259E-6 L 0.22187 0.3368 " pathEditMode="relative" rAng="0" ptsTypes="AA">
-                                      <p:cBhvr>
-                                        <p:cTn id="30" dur="2000" fill="hold"/>
-                                        <p:tgtEl>
-                                          <p:spTgt spid="23"/>
-                                        </p:tgtEl>
-                                        <p:attrNameLst>
-                                          <p:attrName>ppt_x</p:attrName>
-                                          <p:attrName>ppt_y</p:attrName>
-                                        </p:attrNameLst>
-                                      </p:cBhvr>
-                                      <p:rCtr x="11094" y="16829"/>
-                                    </p:animMotion>
                                   </p:childTnLst>
                                 </p:cTn>
                               </p:par>
@@ -3984,14 +4036,54 @@
                             </p:stCondLst>
                             <p:childTnLst>
                               <p:par>
-                                <p:cTn id="33" presetID="10" presetClass="exit" presetSubtype="0" fill="hold" nodeType="clickEffect">
+                                <p:cTn id="33" presetID="42" presetClass="path" presetSubtype="0" accel="50000" decel="50000" fill="hold" nodeType="clickEffect">
+                                  <p:stCondLst>
+                                    <p:cond delay="0"/>
+                                  </p:stCondLst>
+                                  <p:childTnLst>
+                                    <p:animMotion origin="layout" path="M 2.08333E-6 -2.22222E-6 L -0.21524 0.33912 " pathEditMode="relative" rAng="0" ptsTypes="AA">
+                                      <p:cBhvr>
+                                        <p:cTn id="34" dur="2000" fill="hold"/>
+                                        <p:tgtEl>
+                                          <p:spTgt spid="23"/>
+                                        </p:tgtEl>
+                                        <p:attrNameLst>
+                                          <p:attrName>ppt_x</p:attrName>
+                                          <p:attrName>ppt_y</p:attrName>
+                                        </p:attrNameLst>
+                                      </p:cBhvr>
+                                      <p:rCtr x="-10768" y="16944"/>
+                                    </p:animMotion>
+                                  </p:childTnLst>
+                                </p:cTn>
+                              </p:par>
+                            </p:childTnLst>
+                          </p:cTn>
+                        </p:par>
+                      </p:childTnLst>
+                    </p:cTn>
+                  </p:par>
+                  <p:par>
+                    <p:cTn id="35" fill="hold">
+                      <p:stCondLst>
+                        <p:cond delay="indefinite"/>
+                      </p:stCondLst>
+                      <p:childTnLst>
+                        <p:par>
+                          <p:cTn id="36" fill="hold">
+                            <p:stCondLst>
+                              <p:cond delay="0"/>
+                            </p:stCondLst>
+                            <p:childTnLst>
+                              <p:par>
+                                <p:cTn id="37" presetID="10" presetClass="exit" presetSubtype="0" fill="hold" nodeType="clickEffect">
                                   <p:stCondLst>
                                     <p:cond delay="0"/>
                                   </p:stCondLst>
                                   <p:childTnLst>
                                     <p:animEffect transition="out" filter="fade">
                                       <p:cBhvr>
-                                        <p:cTn id="34" dur="500"/>
+                                        <p:cTn id="38" dur="500"/>
                                         <p:tgtEl>
                                           <p:spTgt spid="23"/>
                                         </p:tgtEl>
@@ -3999,7 +4091,7 @@
                                     </p:animEffect>
                                     <p:set>
                                       <p:cBhvr>
-                                        <p:cTn id="35" dur="1" fill="hold">
+                                        <p:cTn id="39" dur="1" fill="hold">
                                           <p:stCondLst>
                                             <p:cond delay="499"/>
                                           </p:stCondLst>
@@ -4025,26 +4117,26 @@
                     </p:cTn>
                   </p:par>
                   <p:par>
-                    <p:cTn id="36" fill="hold">
+                    <p:cTn id="40" fill="hold">
                       <p:stCondLst>
                         <p:cond delay="indefinite"/>
                       </p:stCondLst>
                       <p:childTnLst>
                         <p:par>
-                          <p:cTn id="37" fill="hold">
+                          <p:cTn id="41" fill="hold">
                             <p:stCondLst>
                               <p:cond delay="0"/>
                             </p:stCondLst>
                             <p:childTnLst>
                               <p:par>
-                                <p:cTn id="38" presetID="2" presetClass="entr" presetSubtype="4" fill="hold" nodeType="clickEffect">
+                                <p:cTn id="42" presetID="2" presetClass="entr" presetSubtype="4" fill="hold" nodeType="clickEffect">
                                   <p:stCondLst>
                                     <p:cond delay="0"/>
                                   </p:stCondLst>
                                   <p:childTnLst>
                                     <p:set>
                                       <p:cBhvr>
-                                        <p:cTn id="39" dur="1" fill="hold">
+                                        <p:cTn id="43" dur="1" fill="hold">
                                           <p:stCondLst>
                                             <p:cond delay="0"/>
                                           </p:stCondLst>
@@ -4062,7 +4154,7 @@
                                     </p:set>
                                     <p:anim calcmode="lin" valueType="num">
                                       <p:cBhvr additive="base">
-                                        <p:cTn id="40" dur="500" fill="hold"/>
+                                        <p:cTn id="44" dur="500" fill="hold"/>
                                         <p:tgtEl>
                                           <p:spTgt spid="9"/>
                                         </p:tgtEl>
@@ -4085,7 +4177,7 @@
                                     </p:anim>
                                     <p:anim calcmode="lin" valueType="num">
                                       <p:cBhvr additive="base">
-                                        <p:cTn id="41" dur="500" fill="hold"/>
+                                        <p:cTn id="45" dur="500" fill="hold"/>
                                         <p:tgtEl>
                                           <p:spTgt spid="9"/>
                                         </p:tgtEl>
@@ -4116,26 +4208,26 @@
                     </p:cTn>
                   </p:par>
                   <p:par>
-                    <p:cTn id="42" fill="hold">
+                    <p:cTn id="46" fill="hold">
                       <p:stCondLst>
                         <p:cond delay="indefinite"/>
                       </p:stCondLst>
                       <p:childTnLst>
                         <p:par>
-                          <p:cTn id="43" fill="hold">
+                          <p:cTn id="47" fill="hold">
                             <p:stCondLst>
                               <p:cond delay="0"/>
                             </p:stCondLst>
                             <p:childTnLst>
                               <p:par>
-                                <p:cTn id="44" presetID="26" presetClass="emph" presetSubtype="0" fill="hold" nodeType="clickEffect">
+                                <p:cTn id="48" presetID="26" presetClass="emph" presetSubtype="0" fill="hold" nodeType="clickEffect">
                                   <p:stCondLst>
                                     <p:cond delay="0"/>
                                   </p:stCondLst>
                                   <p:childTnLst>
                                     <p:animEffect transition="out" filter="fade">
                                       <p:cBhvr>
-                                        <p:cTn id="45" dur="500" tmFilter="0, 0; .2, .5; .8, .5; 1, 0"/>
+                                        <p:cTn id="49" dur="500" tmFilter="0, 0; .2, .5; .8, .5; 1, 0"/>
                                         <p:tgtEl>
                                           <p:spTgt spid="9"/>
                                         </p:tgtEl>
@@ -4143,53 +4235,13 @@
                                     </p:animEffect>
                                     <p:animScale>
                                       <p:cBhvr>
-                                        <p:cTn id="46" dur="250" autoRev="1" fill="hold"/>
+                                        <p:cTn id="50" dur="250" autoRev="1" fill="hold"/>
                                         <p:tgtEl>
                                           <p:spTgt spid="9"/>
                                         </p:tgtEl>
                                       </p:cBhvr>
                                       <p:by x="105000" y="105000"/>
                                     </p:animScale>
-                                  </p:childTnLst>
-                                </p:cTn>
-                              </p:par>
-                            </p:childTnLst>
-                          </p:cTn>
-                        </p:par>
-                      </p:childTnLst>
-                    </p:cTn>
-                  </p:par>
-                  <p:par>
-                    <p:cTn id="47" fill="hold">
-                      <p:stCondLst>
-                        <p:cond delay="indefinite"/>
-                      </p:stCondLst>
-                      <p:childTnLst>
-                        <p:par>
-                          <p:cTn id="48" fill="hold">
-                            <p:stCondLst>
-                              <p:cond delay="0"/>
-                            </p:stCondLst>
-                            <p:childTnLst>
-                              <p:par>
-                                <p:cTn id="49" presetID="42" presetClass="path" presetSubtype="0" accel="50000" decel="50000" fill="hold" nodeType="clickEffect">
-                                  <p:stCondLst>
-                                    <p:cond delay="0"/>
-                                  </p:stCondLst>
-                                  <p:childTnLst>
-                                    <p:animMotion origin="layout" path="M 0.05456 0.00393 L -0.19167 0.35023 " pathEditMode="relative" rAng="0" ptsTypes="AA">
-                                      <p:cBhvr>
-                                        <p:cTn id="50" dur="2000" fill="hold"/>
-                                        <p:tgtEl>
-                                          <p:spTgt spid="9"/>
-                                        </p:tgtEl>
-                                        <p:attrNameLst>
-                                          <p:attrName>ppt_x</p:attrName>
-                                          <p:attrName>ppt_y</p:attrName>
-                                        </p:attrNameLst>
-                                      </p:cBhvr>
-                                      <p:rCtr x="-12318" y="17315"/>
-                                    </p:animMotion>
                                   </p:childTnLst>
                                 </p:cTn>
                               </p:par>
@@ -4212,14 +4264,54 @@
                             </p:stCondLst>
                             <p:childTnLst>
                               <p:par>
-                                <p:cTn id="53" presetID="10" presetClass="exit" presetSubtype="0" fill="hold" nodeType="clickEffect">
+                                <p:cTn id="53" presetID="42" presetClass="path" presetSubtype="0" accel="50000" decel="50000" fill="hold" nodeType="clickEffect">
+                                  <p:stCondLst>
+                                    <p:cond delay="0"/>
+                                  </p:stCondLst>
+                                  <p:childTnLst>
+                                    <p:animMotion origin="layout" path="M 2.08333E-7 2.96296E-6 L -0.21016 0.27176 " pathEditMode="relative" rAng="0" ptsTypes="AA">
+                                      <p:cBhvr>
+                                        <p:cTn id="54" dur="2000" fill="hold"/>
+                                        <p:tgtEl>
+                                          <p:spTgt spid="9"/>
+                                        </p:tgtEl>
+                                        <p:attrNameLst>
+                                          <p:attrName>ppt_x</p:attrName>
+                                          <p:attrName>ppt_y</p:attrName>
+                                        </p:attrNameLst>
+                                      </p:cBhvr>
+                                      <p:rCtr x="-10508" y="13588"/>
+                                    </p:animMotion>
+                                  </p:childTnLst>
+                                </p:cTn>
+                              </p:par>
+                            </p:childTnLst>
+                          </p:cTn>
+                        </p:par>
+                      </p:childTnLst>
+                    </p:cTn>
+                  </p:par>
+                  <p:par>
+                    <p:cTn id="55" fill="hold">
+                      <p:stCondLst>
+                        <p:cond delay="indefinite"/>
+                      </p:stCondLst>
+                      <p:childTnLst>
+                        <p:par>
+                          <p:cTn id="56" fill="hold">
+                            <p:stCondLst>
+                              <p:cond delay="0"/>
+                            </p:stCondLst>
+                            <p:childTnLst>
+                              <p:par>
+                                <p:cTn id="57" presetID="10" presetClass="exit" presetSubtype="0" fill="hold" nodeType="clickEffect">
                                   <p:stCondLst>
                                     <p:cond delay="0"/>
                                   </p:stCondLst>
                                   <p:childTnLst>
                                     <p:animEffect transition="out" filter="fade">
                                       <p:cBhvr>
-                                        <p:cTn id="54" dur="500"/>
+                                        <p:cTn id="58" dur="500"/>
                                         <p:tgtEl>
                                           <p:spTgt spid="9"/>
                                         </p:tgtEl>
@@ -4227,7 +4319,7 @@
                                     </p:animEffect>
                                     <p:set>
                                       <p:cBhvr>
-                                        <p:cTn id="55" dur="1" fill="hold">
+                                        <p:cTn id="59" dur="1" fill="hold">
                                           <p:stCondLst>
                                             <p:cond delay="499"/>
                                           </p:stCondLst>
@@ -4253,26 +4345,26 @@
                     </p:cTn>
                   </p:par>
                   <p:par>
-                    <p:cTn id="56" fill="hold">
+                    <p:cTn id="60" fill="hold">
                       <p:stCondLst>
                         <p:cond delay="indefinite"/>
                       </p:stCondLst>
                       <p:childTnLst>
                         <p:par>
-                          <p:cTn id="57" fill="hold">
+                          <p:cTn id="61" fill="hold">
                             <p:stCondLst>
                               <p:cond delay="0"/>
                             </p:stCondLst>
                             <p:childTnLst>
                               <p:par>
-                                <p:cTn id="58" presetID="2" presetClass="entr" presetSubtype="4" fill="hold" nodeType="clickEffect">
+                                <p:cTn id="62" presetID="2" presetClass="entr" presetSubtype="4" fill="hold" nodeType="clickEffect">
                                   <p:stCondLst>
                                     <p:cond delay="0"/>
                                   </p:stCondLst>
                                   <p:childTnLst>
                                     <p:set>
                                       <p:cBhvr>
-                                        <p:cTn id="59" dur="1" fill="hold">
+                                        <p:cTn id="63" dur="1" fill="hold">
                                           <p:stCondLst>
                                             <p:cond delay="0"/>
                                           </p:stCondLst>
@@ -4290,7 +4382,7 @@
                                     </p:set>
                                     <p:anim calcmode="lin" valueType="num">
                                       <p:cBhvr additive="base">
-                                        <p:cTn id="60" dur="500" fill="hold"/>
+                                        <p:cTn id="64" dur="500" fill="hold"/>
                                         <p:tgtEl>
                                           <p:spTgt spid="19"/>
                                         </p:tgtEl>
@@ -4313,7 +4405,7 @@
                                     </p:anim>
                                     <p:anim calcmode="lin" valueType="num">
                                       <p:cBhvr additive="base">
-                                        <p:cTn id="61" dur="500" fill="hold"/>
+                                        <p:cTn id="65" dur="500" fill="hold"/>
                                         <p:tgtEl>
                                           <p:spTgt spid="19"/>
                                         </p:tgtEl>
@@ -4344,26 +4436,26 @@
                     </p:cTn>
                   </p:par>
                   <p:par>
-                    <p:cTn id="62" fill="hold">
+                    <p:cTn id="66" fill="hold">
                       <p:stCondLst>
                         <p:cond delay="indefinite"/>
                       </p:stCondLst>
                       <p:childTnLst>
                         <p:par>
-                          <p:cTn id="63" fill="hold">
+                          <p:cTn id="67" fill="hold">
                             <p:stCondLst>
                               <p:cond delay="0"/>
                             </p:stCondLst>
                             <p:childTnLst>
                               <p:par>
-                                <p:cTn id="64" presetID="26" presetClass="emph" presetSubtype="0" fill="hold" nodeType="clickEffect">
+                                <p:cTn id="68" presetID="26" presetClass="emph" presetSubtype="0" fill="hold" nodeType="clickEffect">
                                   <p:stCondLst>
                                     <p:cond delay="0"/>
                                   </p:stCondLst>
                                   <p:childTnLst>
                                     <p:animEffect transition="out" filter="fade">
                                       <p:cBhvr>
-                                        <p:cTn id="65" dur="500" tmFilter="0, 0; .2, .5; .8, .5; 1, 0"/>
+                                        <p:cTn id="69" dur="500" tmFilter="0, 0; .2, .5; .8, .5; 1, 0"/>
                                         <p:tgtEl>
                                           <p:spTgt spid="19"/>
                                         </p:tgtEl>
@@ -4371,53 +4463,13 @@
                                     </p:animEffect>
                                     <p:animScale>
                                       <p:cBhvr>
-                                        <p:cTn id="66" dur="250" autoRev="1" fill="hold"/>
+                                        <p:cTn id="70" dur="250" autoRev="1" fill="hold"/>
                                         <p:tgtEl>
                                           <p:spTgt spid="19"/>
                                         </p:tgtEl>
                                       </p:cBhvr>
                                       <p:by x="105000" y="105000"/>
                                     </p:animScale>
-                                  </p:childTnLst>
-                                </p:cTn>
-                              </p:par>
-                            </p:childTnLst>
-                          </p:cTn>
-                        </p:par>
-                      </p:childTnLst>
-                    </p:cTn>
-                  </p:par>
-                  <p:par>
-                    <p:cTn id="67" fill="hold">
-                      <p:stCondLst>
-                        <p:cond delay="indefinite"/>
-                      </p:stCondLst>
-                      <p:childTnLst>
-                        <p:par>
-                          <p:cTn id="68" fill="hold">
-                            <p:stCondLst>
-                              <p:cond delay="0"/>
-                            </p:stCondLst>
-                            <p:childTnLst>
-                              <p:par>
-                                <p:cTn id="69" presetID="42" presetClass="path" presetSubtype="0" accel="50000" decel="50000" fill="hold" nodeType="clickEffect">
-                                  <p:stCondLst>
-                                    <p:cond delay="0"/>
-                                  </p:stCondLst>
-                                  <p:childTnLst>
-                                    <p:animMotion origin="layout" path="M 2.08333E-7 3.33333E-6 L 0.22122 0.33727 " pathEditMode="relative" rAng="0" ptsTypes="AA">
-                                      <p:cBhvr>
-                                        <p:cTn id="70" dur="2000" fill="hold"/>
-                                        <p:tgtEl>
-                                          <p:spTgt spid="19"/>
-                                        </p:tgtEl>
-                                        <p:attrNameLst>
-                                          <p:attrName>ppt_x</p:attrName>
-                                          <p:attrName>ppt_y</p:attrName>
-                                        </p:attrNameLst>
-                                      </p:cBhvr>
-                                      <p:rCtr x="11055" y="16852"/>
-                                    </p:animMotion>
                                   </p:childTnLst>
                                 </p:cTn>
                               </p:par>
@@ -4440,14 +4492,54 @@
                             </p:stCondLst>
                             <p:childTnLst>
                               <p:par>
-                                <p:cTn id="73" presetID="10" presetClass="exit" presetSubtype="0" fill="hold" nodeType="clickEffect">
+                                <p:cTn id="73" presetID="42" presetClass="path" presetSubtype="0" accel="50000" decel="50000" fill="hold" nodeType="clickEffect">
+                                  <p:stCondLst>
+                                    <p:cond delay="0"/>
+                                  </p:stCondLst>
+                                  <p:childTnLst>
+                                    <p:animMotion origin="layout" path="M 4.79167E-6 -3.33333E-6 L 0.22057 0.34283 " pathEditMode="relative" rAng="0" ptsTypes="AA">
+                                      <p:cBhvr>
+                                        <p:cTn id="74" dur="2000" fill="hold"/>
+                                        <p:tgtEl>
+                                          <p:spTgt spid="19"/>
+                                        </p:tgtEl>
+                                        <p:attrNameLst>
+                                          <p:attrName>ppt_x</p:attrName>
+                                          <p:attrName>ppt_y</p:attrName>
+                                        </p:attrNameLst>
+                                      </p:cBhvr>
+                                      <p:rCtr x="11029" y="17130"/>
+                                    </p:animMotion>
+                                  </p:childTnLst>
+                                </p:cTn>
+                              </p:par>
+                            </p:childTnLst>
+                          </p:cTn>
+                        </p:par>
+                      </p:childTnLst>
+                    </p:cTn>
+                  </p:par>
+                  <p:par>
+                    <p:cTn id="75" fill="hold">
+                      <p:stCondLst>
+                        <p:cond delay="indefinite"/>
+                      </p:stCondLst>
+                      <p:childTnLst>
+                        <p:par>
+                          <p:cTn id="76" fill="hold">
+                            <p:stCondLst>
+                              <p:cond delay="0"/>
+                            </p:stCondLst>
+                            <p:childTnLst>
+                              <p:par>
+                                <p:cTn id="77" presetID="10" presetClass="exit" presetSubtype="0" fill="hold" nodeType="clickEffect">
                                   <p:stCondLst>
                                     <p:cond delay="0"/>
                                   </p:stCondLst>
                                   <p:childTnLst>
                                     <p:animEffect transition="out" filter="fade">
                                       <p:cBhvr>
-                                        <p:cTn id="74" dur="500"/>
+                                        <p:cTn id="78" dur="500"/>
                                         <p:tgtEl>
                                           <p:spTgt spid="19"/>
                                         </p:tgtEl>
@@ -4455,7 +4547,7 @@
                                     </p:animEffect>
                                     <p:set>
                                       <p:cBhvr>
-                                        <p:cTn id="75" dur="1" fill="hold">
+                                        <p:cTn id="79" dur="1" fill="hold">
                                           <p:stCondLst>
                                             <p:cond delay="499"/>
                                           </p:stCondLst>
@@ -4481,26 +4573,26 @@
                     </p:cTn>
                   </p:par>
                   <p:par>
-                    <p:cTn id="76" fill="hold">
+                    <p:cTn id="80" fill="hold">
                       <p:stCondLst>
                         <p:cond delay="indefinite"/>
                       </p:stCondLst>
                       <p:childTnLst>
                         <p:par>
-                          <p:cTn id="77" fill="hold">
+                          <p:cTn id="81" fill="hold">
                             <p:stCondLst>
                               <p:cond delay="0"/>
                             </p:stCondLst>
                             <p:childTnLst>
                               <p:par>
-                                <p:cTn id="78" presetID="2" presetClass="entr" presetSubtype="4" fill="hold" nodeType="clickEffect">
+                                <p:cTn id="82" presetID="2" presetClass="entr" presetSubtype="4" fill="hold" nodeType="clickEffect">
                                   <p:stCondLst>
                                     <p:cond delay="0"/>
                                   </p:stCondLst>
                                   <p:childTnLst>
                                     <p:set>
                                       <p:cBhvr>
-                                        <p:cTn id="79" dur="1" fill="hold">
+                                        <p:cTn id="83" dur="1" fill="hold">
                                           <p:stCondLst>
                                             <p:cond delay="0"/>
                                           </p:stCondLst>
@@ -4518,7 +4610,7 @@
                                     </p:set>
                                     <p:anim calcmode="lin" valueType="num">
                                       <p:cBhvr additive="base">
-                                        <p:cTn id="80" dur="500" fill="hold"/>
+                                        <p:cTn id="84" dur="500" fill="hold"/>
                                         <p:tgtEl>
                                           <p:spTgt spid="21"/>
                                         </p:tgtEl>
@@ -4541,7 +4633,7 @@
                                     </p:anim>
                                     <p:anim calcmode="lin" valueType="num">
                                       <p:cBhvr additive="base">
-                                        <p:cTn id="81" dur="500" fill="hold"/>
+                                        <p:cTn id="85" dur="500" fill="hold"/>
                                         <p:tgtEl>
                                           <p:spTgt spid="21"/>
                                         </p:tgtEl>
@@ -4572,26 +4664,26 @@
                     </p:cTn>
                   </p:par>
                   <p:par>
-                    <p:cTn id="82" fill="hold">
+                    <p:cTn id="86" fill="hold">
                       <p:stCondLst>
                         <p:cond delay="indefinite"/>
                       </p:stCondLst>
                       <p:childTnLst>
                         <p:par>
-                          <p:cTn id="83" fill="hold">
+                          <p:cTn id="87" fill="hold">
                             <p:stCondLst>
                               <p:cond delay="0"/>
                             </p:stCondLst>
                             <p:childTnLst>
                               <p:par>
-                                <p:cTn id="84" presetID="26" presetClass="emph" presetSubtype="0" fill="hold" nodeType="clickEffect">
+                                <p:cTn id="88" presetID="26" presetClass="emph" presetSubtype="0" fill="hold" nodeType="clickEffect">
                                   <p:stCondLst>
                                     <p:cond delay="0"/>
                                   </p:stCondLst>
                                   <p:childTnLst>
                                     <p:animEffect transition="out" filter="fade">
                                       <p:cBhvr>
-                                        <p:cTn id="85" dur="500" tmFilter="0, 0; .2, .5; .8, .5; 1, 0"/>
+                                        <p:cTn id="89" dur="500" tmFilter="0, 0; .2, .5; .8, .5; 1, 0"/>
                                         <p:tgtEl>
                                           <p:spTgt spid="21"/>
                                         </p:tgtEl>
@@ -4599,53 +4691,13 @@
                                     </p:animEffect>
                                     <p:animScale>
                                       <p:cBhvr>
-                                        <p:cTn id="86" dur="250" autoRev="1" fill="hold"/>
+                                        <p:cTn id="90" dur="250" autoRev="1" fill="hold"/>
                                         <p:tgtEl>
                                           <p:spTgt spid="21"/>
                                         </p:tgtEl>
                                       </p:cBhvr>
                                       <p:by x="105000" y="105000"/>
                                     </p:animScale>
-                                  </p:childTnLst>
-                                </p:cTn>
-                              </p:par>
-                            </p:childTnLst>
-                          </p:cTn>
-                        </p:par>
-                      </p:childTnLst>
-                    </p:cTn>
-                  </p:par>
-                  <p:par>
-                    <p:cTn id="87" fill="hold">
-                      <p:stCondLst>
-                        <p:cond delay="indefinite"/>
-                      </p:stCondLst>
-                      <p:childTnLst>
-                        <p:par>
-                          <p:cTn id="88" fill="hold">
-                            <p:stCondLst>
-                              <p:cond delay="0"/>
-                            </p:stCondLst>
-                            <p:childTnLst>
-                              <p:par>
-                                <p:cTn id="89" presetID="42" presetClass="path" presetSubtype="0" accel="50000" decel="50000" fill="hold" nodeType="clickEffect">
-                                  <p:stCondLst>
-                                    <p:cond delay="0"/>
-                                  </p:stCondLst>
-                                  <p:childTnLst>
-                                    <p:animMotion origin="layout" path="M 2.08333E-7 3.33333E-6 L -0.21016 0.3581 " pathEditMode="relative" rAng="0" ptsTypes="AA">
-                                      <p:cBhvr>
-                                        <p:cTn id="90" dur="2000" fill="hold"/>
-                                        <p:tgtEl>
-                                          <p:spTgt spid="21"/>
-                                        </p:tgtEl>
-                                        <p:attrNameLst>
-                                          <p:attrName>ppt_x</p:attrName>
-                                          <p:attrName>ppt_y</p:attrName>
-                                        </p:attrNameLst>
-                                      </p:cBhvr>
-                                      <p:rCtr x="-10508" y="17894"/>
-                                    </p:animMotion>
                                   </p:childTnLst>
                                 </p:cTn>
                               </p:par>
@@ -4668,14 +4720,54 @@
                             </p:stCondLst>
                             <p:childTnLst>
                               <p:par>
-                                <p:cTn id="93" presetID="10" presetClass="exit" presetSubtype="0" fill="hold" nodeType="clickEffect">
+                                <p:cTn id="93" presetID="42" presetClass="path" presetSubtype="0" accel="50000" decel="50000" fill="hold" nodeType="clickEffect">
+                                  <p:stCondLst>
+                                    <p:cond delay="0"/>
+                                  </p:stCondLst>
+                                  <p:childTnLst>
+                                    <p:animMotion origin="layout" path="M -6.25E-7 2.96296E-6 L 0.20352 0.34884 " pathEditMode="relative" rAng="0" ptsTypes="AA">
+                                      <p:cBhvr>
+                                        <p:cTn id="94" dur="2000" fill="hold"/>
+                                        <p:tgtEl>
+                                          <p:spTgt spid="21"/>
+                                        </p:tgtEl>
+                                        <p:attrNameLst>
+                                          <p:attrName>ppt_x</p:attrName>
+                                          <p:attrName>ppt_y</p:attrName>
+                                        </p:attrNameLst>
+                                      </p:cBhvr>
+                                      <p:rCtr x="10169" y="17431"/>
+                                    </p:animMotion>
+                                  </p:childTnLst>
+                                </p:cTn>
+                              </p:par>
+                            </p:childTnLst>
+                          </p:cTn>
+                        </p:par>
+                      </p:childTnLst>
+                    </p:cTn>
+                  </p:par>
+                  <p:par>
+                    <p:cTn id="95" fill="hold">
+                      <p:stCondLst>
+                        <p:cond delay="indefinite"/>
+                      </p:stCondLst>
+                      <p:childTnLst>
+                        <p:par>
+                          <p:cTn id="96" fill="hold">
+                            <p:stCondLst>
+                              <p:cond delay="0"/>
+                            </p:stCondLst>
+                            <p:childTnLst>
+                              <p:par>
+                                <p:cTn id="97" presetID="10" presetClass="exit" presetSubtype="0" fill="hold" nodeType="clickEffect">
                                   <p:stCondLst>
                                     <p:cond delay="0"/>
                                   </p:stCondLst>
                                   <p:childTnLst>
                                     <p:animEffect transition="out" filter="fade">
                                       <p:cBhvr>
-                                        <p:cTn id="94" dur="500"/>
+                                        <p:cTn id="98" dur="500"/>
                                         <p:tgtEl>
                                           <p:spTgt spid="21"/>
                                         </p:tgtEl>
@@ -4683,7 +4775,7 @@
                                     </p:animEffect>
                                     <p:set>
                                       <p:cBhvr>
-                                        <p:cTn id="95" dur="1" fill="hold">
+                                        <p:cTn id="99" dur="1" fill="hold">
                                           <p:stCondLst>
                                             <p:cond delay="499"/>
                                           </p:stCondLst>
@@ -4725,12 +4817,37 @@
                 </p:cond>
               </p:nextCondLst>
             </p:seq>
+            <p:audio isNarration="1">
+              <p:cMediaNode vol="80000" showWhenStopped="0">
+                <p:cTn id="100" fill="hold" display="0">
+                  <p:stCondLst>
+                    <p:cond delay="indefinite"/>
+                  </p:stCondLst>
+                  <p:endCondLst>
+                    <p:cond evt="onStopAudio" delay="0">
+                      <p:tgtEl>
+                        <p:sldTgt/>
+                      </p:tgtEl>
+                    </p:cond>
+                  </p:endCondLst>
+                </p:cTn>
+                <p:tgtEl>
+                  <p:spTgt spid="5"/>
+                </p:tgtEl>
+              </p:cMediaNode>
+            </p:audio>
           </p:childTnLst>
         </p:cTn>
       </p:par>
     </p:tnLst>
   </p:timing>
 </p:sld>
+</file>
+
+<file path=ppt/tags/tag1.xml><?xml version="1.0" encoding="utf-8"?>
+<p:tagLst xmlns:a="http://schemas.openxmlformats.org/drawingml/2006/main" xmlns:r="http://schemas.openxmlformats.org/officeDocument/2006/relationships" xmlns:p="http://schemas.openxmlformats.org/presentationml/2006/main">
+  <p:tag name="TIMING" val="|2|1.7|1.4|2.4|1|2.1|2.7|1.1|0.8|2.2|2.8|0.9|1.5|1.7|2.5|1.1|0.9|1.2"/>
+</p:tagLst>
 </file>
 
 <file path=ppt/theme/theme1.xml><?xml version="1.0" encoding="utf-8"?>

</xml_diff>